<commit_message>
changed mind on VI, calculating separate from exposure now
</commit_message>
<xml_diff>
--- a/figures.pptx
+++ b/figures.pptx
@@ -112,6 +112,91 @@
 </p:presentation>
 </file>
 
+<file path=ppt/revisionInfo.xml><?xml version="1.0" encoding="utf-8"?>
+<p1510:revInfo xmlns:a="http://schemas.openxmlformats.org/drawingml/2006/main" xmlns:r="http://schemas.openxmlformats.org/officeDocument/2006/relationships" xmlns:p1510="http://schemas.microsoft.com/office/powerpoint/2015/10/main">
+  <p1510:revLst>
+    <p1510:client id="{E956B77E-BAA6-48A7-9A0C-3CBADBEFF92A}" v="5" dt="2025-01-15T15:44:21.645"/>
+  </p1510:revLst>
+</p1510:revInfo>
+</file>
+
+<file path=ppt/changesInfos/changesInfo1.xml><?xml version="1.0" encoding="utf-8"?>
+<pc:chgInfo xmlns:a="http://schemas.openxmlformats.org/drawingml/2006/main" xmlns:r="http://schemas.openxmlformats.org/officeDocument/2006/relationships" xmlns:ac="http://schemas.microsoft.com/office/drawing/2013/main/command" xmlns:pc="http://schemas.microsoft.com/office/powerpoint/2013/main/command">
+  <pc:docChgLst>
+    <pc:chgData name="Allison Binley" userId="53aff1208ed7b64f" providerId="LiveId" clId="{E956B77E-BAA6-48A7-9A0C-3CBADBEFF92A}"/>
+    <pc:docChg chg="modSld">
+      <pc:chgData name="Allison Binley" userId="53aff1208ed7b64f" providerId="LiveId" clId="{E956B77E-BAA6-48A7-9A0C-3CBADBEFF92A}" dt="2025-01-15T15:45:02.136" v="21" actId="1076"/>
+      <pc:docMkLst>
+        <pc:docMk/>
+      </pc:docMkLst>
+      <pc:sldChg chg="modSp mod">
+        <pc:chgData name="Allison Binley" userId="53aff1208ed7b64f" providerId="LiveId" clId="{E956B77E-BAA6-48A7-9A0C-3CBADBEFF92A}" dt="2025-01-15T15:45:02.136" v="21" actId="1076"/>
+        <pc:sldMkLst>
+          <pc:docMk/>
+          <pc:sldMk cId="2962613126" sldId="256"/>
+        </pc:sldMkLst>
+        <pc:spChg chg="mod">
+          <ac:chgData name="Allison Binley" userId="53aff1208ed7b64f" providerId="LiveId" clId="{E956B77E-BAA6-48A7-9A0C-3CBADBEFF92A}" dt="2025-01-15T15:44:21.645" v="4" actId="20577"/>
+          <ac:spMkLst>
+            <pc:docMk/>
+            <pc:sldMk cId="2962613126" sldId="256"/>
+            <ac:spMk id="5" creationId="{95CE781F-254C-2FF8-FC45-DC6910951281}"/>
+          </ac:spMkLst>
+        </pc:spChg>
+        <pc:spChg chg="mod">
+          <ac:chgData name="Allison Binley" userId="53aff1208ed7b64f" providerId="LiveId" clId="{E956B77E-BAA6-48A7-9A0C-3CBADBEFF92A}" dt="2025-01-15T15:44:56.967" v="20" actId="1076"/>
+          <ac:spMkLst>
+            <pc:docMk/>
+            <pc:sldMk cId="2962613126" sldId="256"/>
+            <ac:spMk id="7" creationId="{E389F9F8-5911-47FA-2175-E1E68E1DCEB6}"/>
+          </ac:spMkLst>
+        </pc:spChg>
+        <pc:spChg chg="mod">
+          <ac:chgData name="Allison Binley" userId="53aff1208ed7b64f" providerId="LiveId" clId="{E956B77E-BAA6-48A7-9A0C-3CBADBEFF92A}" dt="2025-01-15T15:44:43.242" v="18" actId="1076"/>
+          <ac:spMkLst>
+            <pc:docMk/>
+            <pc:sldMk cId="2962613126" sldId="256"/>
+            <ac:spMk id="8" creationId="{DDD2DAE8-869B-DECB-CBA4-7A7E3B56986A}"/>
+          </ac:spMkLst>
+        </pc:spChg>
+        <pc:spChg chg="mod">
+          <ac:chgData name="Allison Binley" userId="53aff1208ed7b64f" providerId="LiveId" clId="{E956B77E-BAA6-48A7-9A0C-3CBADBEFF92A}" dt="2025-01-15T15:44:30.103" v="6" actId="14100"/>
+          <ac:spMkLst>
+            <pc:docMk/>
+            <pc:sldMk cId="2962613126" sldId="256"/>
+            <ac:spMk id="9" creationId="{DD2C2CA8-4C01-E3A1-0CF1-76A3AF70BB1C}"/>
+          </ac:spMkLst>
+        </pc:spChg>
+        <pc:spChg chg="mod">
+          <ac:chgData name="Allison Binley" userId="53aff1208ed7b64f" providerId="LiveId" clId="{E956B77E-BAA6-48A7-9A0C-3CBADBEFF92A}" dt="2025-01-15T15:45:02.136" v="21" actId="1076"/>
+          <ac:spMkLst>
+            <pc:docMk/>
+            <pc:sldMk cId="2962613126" sldId="256"/>
+            <ac:spMk id="10" creationId="{CDC4D69C-F27F-BBCB-59ED-A2CA6525F54B}"/>
+          </ac:spMkLst>
+        </pc:spChg>
+        <pc:spChg chg="mod">
+          <ac:chgData name="Allison Binley" userId="53aff1208ed7b64f" providerId="LiveId" clId="{E956B77E-BAA6-48A7-9A0C-3CBADBEFF92A}" dt="2025-01-15T15:44:48.264" v="19" actId="1076"/>
+          <ac:spMkLst>
+            <pc:docMk/>
+            <pc:sldMk cId="2962613126" sldId="256"/>
+            <ac:spMk id="11" creationId="{A4017EC9-B9AC-A9D7-D3AE-E5762C96503B}"/>
+          </ac:spMkLst>
+        </pc:spChg>
+        <pc:spChg chg="mod">
+          <ac:chgData name="Allison Binley" userId="53aff1208ed7b64f" providerId="LiveId" clId="{E956B77E-BAA6-48A7-9A0C-3CBADBEFF92A}" dt="2025-01-15T15:44:35.268" v="17" actId="20577"/>
+          <ac:spMkLst>
+            <pc:docMk/>
+            <pc:sldMk cId="2962613126" sldId="256"/>
+            <ac:spMk id="12" creationId="{314EFD30-AB54-C636-91D9-55A1B47205EF}"/>
+          </ac:spMkLst>
+        </pc:spChg>
+      </pc:sldChg>
+    </pc:docChg>
+  </pc:docChgLst>
+</pc:chgInfo>
+</file>
+
 <file path=ppt/slideLayouts/slideLayout1.xml><?xml version="1.0" encoding="utf-8"?>
 <p:sldLayout xmlns:a="http://schemas.openxmlformats.org/drawingml/2006/main" xmlns:r="http://schemas.openxmlformats.org/officeDocument/2006/relationships" xmlns:p="http://schemas.openxmlformats.org/presentationml/2006/main" type="title" preserve="1">
   <p:cSld name="Title Slide">
@@ -259,7 +344,7 @@
           <a:p>
             <a:fld id="{7D7AC490-4278-4F24-9FBC-8CC7712059A7}" type="datetimeFigureOut">
               <a:rPr lang="en-US" smtClean="0"/>
-              <a:t>1/13/2025</a:t>
+              <a:t>1/15/2025</a:t>
             </a:fld>
             <a:endParaRPr lang="en-US"/>
           </a:p>
@@ -457,7 +542,7 @@
           <a:p>
             <a:fld id="{7D7AC490-4278-4F24-9FBC-8CC7712059A7}" type="datetimeFigureOut">
               <a:rPr lang="en-US" smtClean="0"/>
-              <a:t>1/13/2025</a:t>
+              <a:t>1/15/2025</a:t>
             </a:fld>
             <a:endParaRPr lang="en-US"/>
           </a:p>
@@ -665,7 +750,7 @@
           <a:p>
             <a:fld id="{7D7AC490-4278-4F24-9FBC-8CC7712059A7}" type="datetimeFigureOut">
               <a:rPr lang="en-US" smtClean="0"/>
-              <a:t>1/13/2025</a:t>
+              <a:t>1/15/2025</a:t>
             </a:fld>
             <a:endParaRPr lang="en-US"/>
           </a:p>
@@ -863,7 +948,7 @@
           <a:p>
             <a:fld id="{7D7AC490-4278-4F24-9FBC-8CC7712059A7}" type="datetimeFigureOut">
               <a:rPr lang="en-US" smtClean="0"/>
-              <a:t>1/13/2025</a:t>
+              <a:t>1/15/2025</a:t>
             </a:fld>
             <a:endParaRPr lang="en-US"/>
           </a:p>
@@ -1138,7 +1223,7 @@
           <a:p>
             <a:fld id="{7D7AC490-4278-4F24-9FBC-8CC7712059A7}" type="datetimeFigureOut">
               <a:rPr lang="en-US" smtClean="0"/>
-              <a:t>1/13/2025</a:t>
+              <a:t>1/15/2025</a:t>
             </a:fld>
             <a:endParaRPr lang="en-US"/>
           </a:p>
@@ -1403,7 +1488,7 @@
           <a:p>
             <a:fld id="{7D7AC490-4278-4F24-9FBC-8CC7712059A7}" type="datetimeFigureOut">
               <a:rPr lang="en-US" smtClean="0"/>
-              <a:t>1/13/2025</a:t>
+              <a:t>1/15/2025</a:t>
             </a:fld>
             <a:endParaRPr lang="en-US"/>
           </a:p>
@@ -1815,7 +1900,7 @@
           <a:p>
             <a:fld id="{7D7AC490-4278-4F24-9FBC-8CC7712059A7}" type="datetimeFigureOut">
               <a:rPr lang="en-US" smtClean="0"/>
-              <a:t>1/13/2025</a:t>
+              <a:t>1/15/2025</a:t>
             </a:fld>
             <a:endParaRPr lang="en-US"/>
           </a:p>
@@ -1956,7 +2041,7 @@
           <a:p>
             <a:fld id="{7D7AC490-4278-4F24-9FBC-8CC7712059A7}" type="datetimeFigureOut">
               <a:rPr lang="en-US" smtClean="0"/>
-              <a:t>1/13/2025</a:t>
+              <a:t>1/15/2025</a:t>
             </a:fld>
             <a:endParaRPr lang="en-US"/>
           </a:p>
@@ -2069,7 +2154,7 @@
           <a:p>
             <a:fld id="{7D7AC490-4278-4F24-9FBC-8CC7712059A7}" type="datetimeFigureOut">
               <a:rPr lang="en-US" smtClean="0"/>
-              <a:t>1/13/2025</a:t>
+              <a:t>1/15/2025</a:t>
             </a:fld>
             <a:endParaRPr lang="en-US"/>
           </a:p>
@@ -2380,7 +2465,7 @@
           <a:p>
             <a:fld id="{7D7AC490-4278-4F24-9FBC-8CC7712059A7}" type="datetimeFigureOut">
               <a:rPr lang="en-US" smtClean="0"/>
-              <a:t>1/13/2025</a:t>
+              <a:t>1/15/2025</a:t>
             </a:fld>
             <a:endParaRPr lang="en-US"/>
           </a:p>
@@ -2668,7 +2753,7 @@
           <a:p>
             <a:fld id="{7D7AC490-4278-4F24-9FBC-8CC7712059A7}" type="datetimeFigureOut">
               <a:rPr lang="en-US" smtClean="0"/>
-              <a:t>1/13/2025</a:t>
+              <a:t>1/15/2025</a:t>
             </a:fld>
             <a:endParaRPr lang="en-US"/>
           </a:p>
@@ -2909,7 +2994,7 @@
           <a:p>
             <a:fld id="{7D7AC490-4278-4F24-9FBC-8CC7712059A7}" type="datetimeFigureOut">
               <a:rPr lang="en-US" smtClean="0"/>
-              <a:t>1/13/2025</a:t>
+              <a:t>1/15/2025</a:t>
             </a:fld>
             <a:endParaRPr lang="en-US"/>
           </a:p>
@@ -3481,43 +3566,13 @@
                         </a:rPr>
                         <m:t>∗</m:t>
                       </m:r>
-                      <m:f>
-                        <m:fPr>
-                          <m:ctrlPr>
-                            <a:rPr lang="en-US" sz="3600" i="1">
-                              <a:latin typeface="Cambria Math" panose="02040503050406030204" pitchFamily="18" charset="0"/>
-                            </a:rPr>
-                          </m:ctrlPr>
-                        </m:fPr>
-                        <m:num>
-                          <m:r>
-                            <a:rPr lang="en-US" sz="3600" b="0" i="1" smtClean="0">
-                              <a:latin typeface="Cambria Math" panose="02040503050406030204" pitchFamily="18" charset="0"/>
-                            </a:rPr>
-                            <m:t>𝐻𝑆</m:t>
-                          </m:r>
-                          <m:r>
-                            <a:rPr lang="en-US" sz="3600" i="1">
-                              <a:latin typeface="Cambria Math" panose="02040503050406030204" pitchFamily="18" charset="0"/>
-                            </a:rPr>
-                            <m:t>+</m:t>
-                          </m:r>
-                          <m:r>
-                            <a:rPr lang="en-US" sz="3600" b="0" i="1" smtClean="0">
-                              <a:latin typeface="Cambria Math" panose="02040503050406030204" pitchFamily="18" charset="0"/>
-                            </a:rPr>
-                            <m:t>𝐸𝑋𝑃</m:t>
-                          </m:r>
-                        </m:num>
-                        <m:den>
-                          <m:r>
-                            <a:rPr lang="en-US" sz="3600" i="1">
-                              <a:latin typeface="Cambria Math" panose="02040503050406030204" pitchFamily="18" charset="0"/>
-                            </a:rPr>
-                            <m:t>2</m:t>
-                          </m:r>
-                        </m:den>
-                      </m:f>
+                      <m:r>
+                        <a:rPr lang="en-CA" sz="3600" b="0" i="1" smtClean="0">
+                          <a:effectLst/>
+                          <a:latin typeface="Cambria Math" panose="02040503050406030204" pitchFamily="18" charset="0"/>
+                        </a:rPr>
+                        <m:t>𝐻𝑆</m:t>
+                      </m:r>
                     </m:oMath>
                   </m:oMathPara>
                 </a14:m>
@@ -3569,7 +3624,7 @@
               <a:lstStyle/>
               <a:p>
                 <a:r>
-                  <a:rPr lang="en-US">
+                  <a:rPr lang="en-CA">
                     <a:noFill/>
                   </a:rPr>
                   <a:t> </a:t>
@@ -3593,7 +3648,7 @@
         </p:nvSpPr>
         <p:spPr>
           <a:xfrm rot="5400000">
-            <a:off x="4061603" y="1636059"/>
+            <a:off x="4778158" y="1641349"/>
             <a:ext cx="485030" cy="1602563"/>
           </a:xfrm>
           <a:prstGeom prst="leftBrace">
@@ -3643,7 +3698,7 @@
         </p:nvSpPr>
         <p:spPr>
           <a:xfrm rot="5400000">
-            <a:off x="6126505" y="1829066"/>
+            <a:off x="6735806" y="1829065"/>
             <a:ext cx="485030" cy="1216550"/>
           </a:xfrm>
           <a:prstGeom prst="leftBrace">
@@ -3687,8 +3742,8 @@
         </p:nvSpPr>
         <p:spPr>
           <a:xfrm rot="5400000">
-            <a:off x="8186332" y="1328331"/>
-            <a:ext cx="602804" cy="2335792"/>
+            <a:off x="8249703" y="2124930"/>
+            <a:ext cx="602804" cy="742594"/>
           </a:xfrm>
           <a:prstGeom prst="leftBrace">
             <a:avLst/>
@@ -3731,7 +3786,7 @@
         </p:nvSpPr>
         <p:spPr>
           <a:xfrm>
-            <a:off x="3718208" y="1451490"/>
+            <a:off x="4491842" y="1456026"/>
             <a:ext cx="1057662" cy="646331"/>
           </a:xfrm>
           <a:prstGeom prst="rect">
@@ -3786,7 +3841,7 @@
         </p:nvSpPr>
         <p:spPr>
           <a:xfrm>
-            <a:off x="5759718" y="1455088"/>
+            <a:off x="6367993" y="1455088"/>
             <a:ext cx="1218603" cy="369332"/>
           </a:xfrm>
           <a:prstGeom prst="rect">
@@ -3828,8 +3883,8 @@
         </p:nvSpPr>
         <p:spPr>
           <a:xfrm>
-            <a:off x="8179808" y="1455088"/>
-            <a:ext cx="603050" cy="369332"/>
+            <a:off x="7882452" y="1455088"/>
+            <a:ext cx="1197765" cy="369332"/>
           </a:xfrm>
           <a:prstGeom prst="rect">
             <a:avLst/>
@@ -3851,7 +3906,7 @@
                   </a:schemeClr>
                 </a:solidFill>
               </a:rPr>
-              <a:t>Risk</a:t>
+              <a:t>Sensitivity</a:t>
             </a:r>
           </a:p>
         </p:txBody>

</xml_diff>